<commit_message>
ppt is done #14
</commit_message>
<xml_diff>
--- a/Eminem.pptx
+++ b/Eminem.pptx
@@ -6767,31 +6767,41 @@
           </a:p>
         </p:txBody>
       </p:sp>
-      <p:sp>
-        <p:nvSpPr>
-          <p:cNvPr id="3" name="Tartalom helye 2">
+      <p:pic>
+        <p:nvPicPr>
+          <p:cNvPr id="6" name="Tartalom helye 5">
             <a:extLst>
               <a:ext uri="{FF2B5EF4-FFF2-40B4-BE49-F238E27FC236}">
-                <a16:creationId xmlns:a16="http://schemas.microsoft.com/office/drawing/2014/main" id="{018E8CE1-3642-49E1-9BF0-414236491B3E}"/>
+                <a16:creationId xmlns:a16="http://schemas.microsoft.com/office/drawing/2014/main" id="{F9355F01-416A-4CA2-88B2-C47D7C25F7EB}"/>
               </a:ext>
             </a:extLst>
           </p:cNvPr>
-          <p:cNvSpPr>
-            <a:spLocks noGrp="1"/>
-          </p:cNvSpPr>
+          <p:cNvPicPr>
+            <a:picLocks noGrp="1" noChangeAspect="1"/>
+          </p:cNvPicPr>
           <p:nvPr>
             <p:ph sz="quarter" idx="13"/>
           </p:nvPr>
-        </p:nvSpPr>
-        <p:spPr/>
-        <p:txBody>
-          <a:bodyPr/>
-          <a:lstStyle/>
-          <a:p>
-            <a:endParaRPr lang="hu-HU"/>
-          </a:p>
-        </p:txBody>
-      </p:sp>
+        </p:nvPicPr>
+        <p:blipFill>
+          <a:blip r:embed="rId2" cstate="print">
+            <a:extLst>
+              <a:ext uri="{28A0092B-C50C-407E-A947-70E740481C1C}">
+                <a14:useLocalDpi xmlns:a14="http://schemas.microsoft.com/office/drawing/2010/main" val="0"/>
+              </a:ext>
+            </a:extLst>
+          </a:blip>
+          <a:stretch>
+            <a:fillRect/>
+          </a:stretch>
+        </p:blipFill>
+        <p:spPr>
+          <a:xfrm>
+            <a:off x="6095999" y="0"/>
+            <a:ext cx="1981553" cy="5598695"/>
+          </a:xfrm>
+        </p:spPr>
+      </p:pic>
       <p:sp>
         <p:nvSpPr>
           <p:cNvPr id="4" name="Szöveg helye 3">

</xml_diff>